<commit_message>
⚡ Added Session 2 of JavaScript
</commit_message>
<xml_diff>
--- a/JavaScript/JavaScript_Session-1.pptx
+++ b/JavaScript/JavaScript_Session-1.pptx
@@ -14581,15 +14581,7 @@
             </a:pPr>
             <a:r>
               <a:rPr lang="en"/>
-              <a:t>Modules </a:t>
-            </a:r>
-            <a:r>
-              <a:rPr lang="en">
-                <a:solidFill>
-                  <a:schemeClr val="lt2"/>
-                </a:solidFill>
-              </a:rPr>
-              <a:t>(Optional)</a:t>
+              <a:t>Modules</a:t>
             </a:r>
             <a:endParaRPr>
               <a:solidFill>
@@ -17080,7 +17072,26 @@
             </a:pPr>
             <a:r>
               <a:rPr lang="en"/>
-              <a:t>Writing into an HTML element, using innerHTML.</a:t>
+              <a:t>Writing into an HTML element, using </a:t>
+            </a:r>
+            <a:r>
+              <a:rPr b="1" lang="en" sz="1750">
+                <a:solidFill>
+                  <a:srgbClr val="0000CD"/>
+                </a:solidFill>
+                <a:highlight>
+                  <a:srgbClr val="FFFFFF"/>
+                </a:highlight>
+                <a:latin typeface="Courier New"/>
+                <a:ea typeface="Courier New"/>
+                <a:cs typeface="Courier New"/>
+                <a:sym typeface="Courier New"/>
+              </a:rPr>
+              <a:t>innerHTML</a:t>
+            </a:r>
+            <a:r>
+              <a:rPr lang="en"/>
+              <a:t>.</a:t>
             </a:r>
             <a:endParaRPr/>
           </a:p>
@@ -17101,7 +17112,26 @@
             </a:pPr>
             <a:r>
               <a:rPr lang="en"/>
-              <a:t>Writing into the HTML output using document.write().</a:t>
+              <a:t>Writing into the HTML output using </a:t>
+            </a:r>
+            <a:r>
+              <a:rPr b="1" lang="en" sz="1750">
+                <a:solidFill>
+                  <a:srgbClr val="0000CD"/>
+                </a:solidFill>
+                <a:highlight>
+                  <a:srgbClr val="FFFFFF"/>
+                </a:highlight>
+                <a:latin typeface="Courier New"/>
+                <a:ea typeface="Courier New"/>
+                <a:cs typeface="Courier New"/>
+                <a:sym typeface="Courier New"/>
+              </a:rPr>
+              <a:t>document.write()</a:t>
+            </a:r>
+            <a:r>
+              <a:rPr lang="en"/>
+              <a:t>.</a:t>
             </a:r>
             <a:endParaRPr/>
           </a:p>
@@ -17122,7 +17152,26 @@
             </a:pPr>
             <a:r>
               <a:rPr lang="en"/>
-              <a:t>Writing into an alert box, using window.alert().</a:t>
+              <a:t>Writing into an alert box, using </a:t>
+            </a:r>
+            <a:r>
+              <a:rPr b="1" lang="en" sz="1750">
+                <a:solidFill>
+                  <a:srgbClr val="0000CD"/>
+                </a:solidFill>
+                <a:highlight>
+                  <a:srgbClr val="FFFFFF"/>
+                </a:highlight>
+                <a:latin typeface="Courier New"/>
+                <a:ea typeface="Courier New"/>
+                <a:cs typeface="Courier New"/>
+                <a:sym typeface="Courier New"/>
+              </a:rPr>
+              <a:t>window.alert()</a:t>
+            </a:r>
+            <a:r>
+              <a:rPr lang="en"/>
+              <a:t>.</a:t>
             </a:r>
             <a:endParaRPr/>
           </a:p>
@@ -17143,7 +17192,26 @@
             </a:pPr>
             <a:r>
               <a:rPr lang="en"/>
-              <a:t>Writing into the browser console, using console.log().</a:t>
+              <a:t>Writing into the browser console, using </a:t>
+            </a:r>
+            <a:r>
+              <a:rPr b="1" lang="en" sz="1750">
+                <a:solidFill>
+                  <a:srgbClr val="0000CD"/>
+                </a:solidFill>
+                <a:highlight>
+                  <a:srgbClr val="FFFFFF"/>
+                </a:highlight>
+                <a:latin typeface="Courier New"/>
+                <a:ea typeface="Courier New"/>
+                <a:cs typeface="Courier New"/>
+                <a:sym typeface="Courier New"/>
+              </a:rPr>
+              <a:t>console.log()</a:t>
+            </a:r>
+            <a:r>
+              <a:rPr lang="en"/>
+              <a:t>.</a:t>
             </a:r>
             <a:endParaRPr sz="1150">
               <a:solidFill>
@@ -17359,10 +17427,13 @@
               <a:t>Using </a:t>
             </a:r>
             <a:r>
-              <a:rPr b="1" lang="en">
-                <a:solidFill>
-                  <a:schemeClr val="accent3"/>
-                </a:solidFill>
+              <a:rPr b="1" lang="en" sz="1750">
+                <a:solidFill>
+                  <a:srgbClr val="0000CD"/>
+                </a:solidFill>
+                <a:highlight>
+                  <a:srgbClr val="FFFFFF"/>
+                </a:highlight>
                 <a:latin typeface="Courier New"/>
                 <a:ea typeface="Courier New"/>
                 <a:cs typeface="Courier New"/>
@@ -17400,10 +17471,13 @@
               <a:t>Using </a:t>
             </a:r>
             <a:r>
-              <a:rPr b="1" lang="en">
-                <a:solidFill>
-                  <a:schemeClr val="accent3"/>
-                </a:solidFill>
+              <a:rPr b="1" lang="en" sz="1750">
+                <a:solidFill>
+                  <a:srgbClr val="0000CD"/>
+                </a:solidFill>
+                <a:highlight>
+                  <a:srgbClr val="FFFFFF"/>
+                </a:highlight>
                 <a:latin typeface="Courier New"/>
                 <a:ea typeface="Courier New"/>
                 <a:cs typeface="Courier New"/>
@@ -17441,10 +17515,13 @@
               <a:t>Using </a:t>
             </a:r>
             <a:r>
-              <a:rPr b="1" lang="en">
-                <a:solidFill>
-                  <a:schemeClr val="accent3"/>
-                </a:solidFill>
+              <a:rPr b="1" lang="en" sz="1750">
+                <a:solidFill>
+                  <a:srgbClr val="0000CD"/>
+                </a:solidFill>
+                <a:highlight>
+                  <a:srgbClr val="FFFFFF"/>
+                </a:highlight>
                 <a:latin typeface="Courier New"/>
                 <a:ea typeface="Courier New"/>
                 <a:cs typeface="Courier New"/>
@@ -17452,7 +17529,7 @@
               </a:rPr>
               <a:t>const</a:t>
             </a:r>
-            <a:endParaRPr/>
+            <a:endParaRPr sz="2400"/>
           </a:p>
         </p:txBody>
       </p:sp>

</xml_diff>